<commit_message>
modified looping functionality using DynamicTask
</commit_message>
<xml_diff>
--- a/Design Log/Music Library.pptx
+++ b/Design Log/Music Library.pptx
@@ -9,6 +9,8 @@
     <p:sldId id="257" r:id="rId3"/>
     <p:sldId id="258" r:id="rId4"/>
     <p:sldId id="259" r:id="rId5"/>
+    <p:sldId id="260" r:id="rId6"/>
+    <p:sldId id="261" r:id="rId7"/>
   </p:sldIdLst>
   <p:sldSz cx="12192000" cy="6858000"/>
   <p:notesSz cx="6858000" cy="9144000"/>
@@ -107,6 +109,11 @@
       </a:defRPr>
     </a:lvl9pPr>
   </p:defaultTextStyle>
+  <p:extLst>
+    <p:ext uri="{EFAFB233-063F-42B5-8137-9DF3F51BA10A}">
+      <p15:sldGuideLst xmlns:p15="http://schemas.microsoft.com/office/powerpoint/2012/main"/>
+    </p:ext>
+  </p:extLst>
 </p:presentation>
 </file>
 
@@ -259,7 +266,7 @@
           <a:p>
             <a:fld id="{0506D139-8255-4032-8342-CDBE6BDAFC36}" type="datetimeFigureOut">
               <a:rPr lang="nl-NL" smtClean="0"/>
-              <a:t>29-3-2025</a:t>
+              <a:t>23-4-2025</a:t>
             </a:fld>
             <a:endParaRPr lang="nl-NL"/>
           </a:p>
@@ -459,7 +466,7 @@
           <a:p>
             <a:fld id="{0506D139-8255-4032-8342-CDBE6BDAFC36}" type="datetimeFigureOut">
               <a:rPr lang="nl-NL" smtClean="0"/>
-              <a:t>29-3-2025</a:t>
+              <a:t>23-4-2025</a:t>
             </a:fld>
             <a:endParaRPr lang="nl-NL"/>
           </a:p>
@@ -669,7 +676,7 @@
           <a:p>
             <a:fld id="{0506D139-8255-4032-8342-CDBE6BDAFC36}" type="datetimeFigureOut">
               <a:rPr lang="nl-NL" smtClean="0"/>
-              <a:t>29-3-2025</a:t>
+              <a:t>23-4-2025</a:t>
             </a:fld>
             <a:endParaRPr lang="nl-NL"/>
           </a:p>
@@ -869,7 +876,7 @@
           <a:p>
             <a:fld id="{0506D139-8255-4032-8342-CDBE6BDAFC36}" type="datetimeFigureOut">
               <a:rPr lang="nl-NL" smtClean="0"/>
-              <a:t>29-3-2025</a:t>
+              <a:t>23-4-2025</a:t>
             </a:fld>
             <a:endParaRPr lang="nl-NL"/>
           </a:p>
@@ -1145,7 +1152,7 @@
           <a:p>
             <a:fld id="{0506D139-8255-4032-8342-CDBE6BDAFC36}" type="datetimeFigureOut">
               <a:rPr lang="nl-NL" smtClean="0"/>
-              <a:t>29-3-2025</a:t>
+              <a:t>23-4-2025</a:t>
             </a:fld>
             <a:endParaRPr lang="nl-NL"/>
           </a:p>
@@ -1413,7 +1420,7 @@
           <a:p>
             <a:fld id="{0506D139-8255-4032-8342-CDBE6BDAFC36}" type="datetimeFigureOut">
               <a:rPr lang="nl-NL" smtClean="0"/>
-              <a:t>29-3-2025</a:t>
+              <a:t>23-4-2025</a:t>
             </a:fld>
             <a:endParaRPr lang="nl-NL"/>
           </a:p>
@@ -1828,7 +1835,7 @@
           <a:p>
             <a:fld id="{0506D139-8255-4032-8342-CDBE6BDAFC36}" type="datetimeFigureOut">
               <a:rPr lang="nl-NL" smtClean="0"/>
-              <a:t>29-3-2025</a:t>
+              <a:t>23-4-2025</a:t>
             </a:fld>
             <a:endParaRPr lang="nl-NL"/>
           </a:p>
@@ -1970,7 +1977,7 @@
           <a:p>
             <a:fld id="{0506D139-8255-4032-8342-CDBE6BDAFC36}" type="datetimeFigureOut">
               <a:rPr lang="nl-NL" smtClean="0"/>
-              <a:t>29-3-2025</a:t>
+              <a:t>23-4-2025</a:t>
             </a:fld>
             <a:endParaRPr lang="nl-NL"/>
           </a:p>
@@ -2083,7 +2090,7 @@
           <a:p>
             <a:fld id="{0506D139-8255-4032-8342-CDBE6BDAFC36}" type="datetimeFigureOut">
               <a:rPr lang="nl-NL" smtClean="0"/>
-              <a:t>29-3-2025</a:t>
+              <a:t>23-4-2025</a:t>
             </a:fld>
             <a:endParaRPr lang="nl-NL"/>
           </a:p>
@@ -2396,7 +2403,7 @@
           <a:p>
             <a:fld id="{0506D139-8255-4032-8342-CDBE6BDAFC36}" type="datetimeFigureOut">
               <a:rPr lang="nl-NL" smtClean="0"/>
-              <a:t>29-3-2025</a:t>
+              <a:t>23-4-2025</a:t>
             </a:fld>
             <a:endParaRPr lang="nl-NL"/>
           </a:p>
@@ -2685,7 +2692,7 @@
           <a:p>
             <a:fld id="{0506D139-8255-4032-8342-CDBE6BDAFC36}" type="datetimeFigureOut">
               <a:rPr lang="nl-NL" smtClean="0"/>
-              <a:t>29-3-2025</a:t>
+              <a:t>23-4-2025</a:t>
             </a:fld>
             <a:endParaRPr lang="nl-NL"/>
           </a:p>
@@ -2928,7 +2935,7 @@
           <a:p>
             <a:fld id="{0506D139-8255-4032-8342-CDBE6BDAFC36}" type="datetimeFigureOut">
               <a:rPr lang="nl-NL" smtClean="0"/>
-              <a:t>29-3-2025</a:t>
+              <a:t>23-4-2025</a:t>
             </a:fld>
             <a:endParaRPr lang="nl-NL"/>
           </a:p>
@@ -5093,6 +5100,786 @@
     <p:extLst>
       <p:ext uri="{BB962C8B-B14F-4D97-AF65-F5344CB8AC3E}">
         <p14:creationId xmlns:p14="http://schemas.microsoft.com/office/powerpoint/2010/main" val="4195682092"/>
+      </p:ext>
+    </p:extLst>
+  </p:cSld>
+  <p:clrMapOvr>
+    <a:masterClrMapping/>
+  </p:clrMapOvr>
+</p:sld>
+</file>
+
+<file path=ppt/slides/slide5.xml><?xml version="1.0" encoding="utf-8"?>
+<p:sld xmlns:a="http://schemas.openxmlformats.org/drawingml/2006/main" xmlns:r="http://schemas.openxmlformats.org/officeDocument/2006/relationships" xmlns:p="http://schemas.openxmlformats.org/presentationml/2006/main">
+  <p:cSld>
+    <p:spTree>
+      <p:nvGrpSpPr>
+        <p:cNvPr id="1" name=""/>
+        <p:cNvGrpSpPr/>
+        <p:nvPr/>
+      </p:nvGrpSpPr>
+      <p:grpSpPr>
+        <a:xfrm>
+          <a:off x="0" y="0"/>
+          <a:ext cx="0" cy="0"/>
+          <a:chOff x="0" y="0"/>
+          <a:chExt cx="0" cy="0"/>
+        </a:xfrm>
+      </p:grpSpPr>
+      <p:sp>
+        <p:nvSpPr>
+          <p:cNvPr id="2" name="Title 1">
+            <a:extLst>
+              <a:ext uri="{FF2B5EF4-FFF2-40B4-BE49-F238E27FC236}">
+                <a16:creationId xmlns:a16="http://schemas.microsoft.com/office/drawing/2014/main" id="{9F627155-AAA3-3A94-AD5C-AE55AD975176}"/>
+              </a:ext>
+            </a:extLst>
+          </p:cNvPr>
+          <p:cNvSpPr>
+            <a:spLocks noGrp="1"/>
+          </p:cNvSpPr>
+          <p:nvPr>
+            <p:ph type="title"/>
+          </p:nvPr>
+        </p:nvSpPr>
+        <p:spPr/>
+        <p:txBody>
+          <a:bodyPr/>
+          <a:lstStyle/>
+          <a:p>
+            <a:r>
+              <a:rPr lang="nl-NL" dirty="0" err="1"/>
+              <a:t>Temporary</a:t>
+            </a:r>
+            <a:r>
+              <a:rPr lang="nl-NL" dirty="0"/>
+              <a:t> solution</a:t>
+            </a:r>
+          </a:p>
+        </p:txBody>
+      </p:sp>
+      <p:sp>
+        <p:nvSpPr>
+          <p:cNvPr id="3" name="Content Placeholder 2">
+            <a:extLst>
+              <a:ext uri="{FF2B5EF4-FFF2-40B4-BE49-F238E27FC236}">
+                <a16:creationId xmlns:a16="http://schemas.microsoft.com/office/drawing/2014/main" id="{D0A534B8-937E-A128-5190-575C95043BE9}"/>
+              </a:ext>
+            </a:extLst>
+          </p:cNvPr>
+          <p:cNvSpPr>
+            <a:spLocks noGrp="1"/>
+          </p:cNvSpPr>
+          <p:nvPr>
+            <p:ph idx="1"/>
+          </p:nvPr>
+        </p:nvSpPr>
+        <p:spPr/>
+        <p:txBody>
+          <a:bodyPr/>
+          <a:lstStyle/>
+          <a:p>
+            <a:r>
+              <a:rPr lang="nl-NL" dirty="0" err="1"/>
+              <a:t>Modifying</a:t>
+            </a:r>
+            <a:r>
+              <a:rPr lang="nl-NL" dirty="0"/>
+              <a:t> </a:t>
+            </a:r>
+            <a:r>
+              <a:rPr lang="nl-NL" dirty="0" err="1"/>
+              <a:t>the</a:t>
+            </a:r>
+            <a:r>
+              <a:rPr lang="nl-NL" dirty="0"/>
+              <a:t> </a:t>
+            </a:r>
+            <a:r>
+              <a:rPr lang="nl-NL" dirty="0" err="1"/>
+              <a:t>traktor</a:t>
+            </a:r>
+            <a:r>
+              <a:rPr lang="nl-NL" dirty="0"/>
+              <a:t> </a:t>
+            </a:r>
+            <a:r>
+              <a:rPr lang="nl-NL" dirty="0" err="1"/>
+              <a:t>collection</a:t>
+            </a:r>
+            <a:r>
+              <a:rPr lang="nl-NL" dirty="0"/>
+              <a:t> file takes </a:t>
+            </a:r>
+            <a:r>
+              <a:rPr lang="nl-NL" dirty="0" err="1"/>
+              <a:t>quite</a:t>
+            </a:r>
+            <a:r>
+              <a:rPr lang="nl-NL" dirty="0"/>
+              <a:t> </a:t>
+            </a:r>
+            <a:r>
+              <a:rPr lang="nl-NL" dirty="0" err="1"/>
+              <a:t>some</a:t>
+            </a:r>
+            <a:r>
+              <a:rPr lang="nl-NL" dirty="0"/>
+              <a:t> time </a:t>
+            </a:r>
+            <a:r>
+              <a:rPr lang="nl-NL" dirty="0" err="1"/>
+              <a:t>to</a:t>
+            </a:r>
+            <a:r>
+              <a:rPr lang="nl-NL" dirty="0"/>
+              <a:t> </a:t>
+            </a:r>
+            <a:r>
+              <a:rPr lang="nl-NL" dirty="0" err="1"/>
+              <a:t>implement</a:t>
+            </a:r>
+            <a:endParaRPr lang="nl-NL" dirty="0"/>
+          </a:p>
+          <a:p>
+            <a:r>
+              <a:rPr lang="nl-NL" dirty="0"/>
+              <a:t>Make a list of </a:t>
+            </a:r>
+            <a:r>
+              <a:rPr lang="nl-NL" dirty="0" err="1"/>
+              <a:t>nameless</a:t>
+            </a:r>
+            <a:r>
+              <a:rPr lang="nl-NL" dirty="0"/>
+              <a:t> </a:t>
+            </a:r>
+            <a:r>
+              <a:rPr lang="nl-NL" dirty="0" err="1"/>
+              <a:t>playlist</a:t>
+            </a:r>
+            <a:r>
+              <a:rPr lang="nl-NL" dirty="0"/>
+              <a:t> </a:t>
+            </a:r>
+            <a:r>
+              <a:rPr lang="nl-NL" dirty="0" err="1"/>
+              <a:t>with</a:t>
+            </a:r>
+            <a:r>
+              <a:rPr lang="nl-NL" dirty="0"/>
+              <a:t> </a:t>
+            </a:r>
+            <a:r>
+              <a:rPr lang="nl-NL" dirty="0" err="1"/>
+              <a:t>UUIDs</a:t>
+            </a:r>
+            <a:r>
+              <a:rPr lang="nl-NL" dirty="0"/>
+              <a:t> </a:t>
+            </a:r>
+            <a:r>
+              <a:rPr lang="nl-NL" dirty="0" err="1"/>
+              <a:t>and</a:t>
+            </a:r>
+            <a:r>
+              <a:rPr lang="nl-NL" dirty="0"/>
+              <a:t> print </a:t>
+            </a:r>
+            <a:r>
+              <a:rPr lang="nl-NL" dirty="0" err="1"/>
+              <a:t>associated</a:t>
+            </a:r>
+            <a:r>
+              <a:rPr lang="nl-NL" dirty="0"/>
+              <a:t> barcodes</a:t>
+            </a:r>
+          </a:p>
+          <a:p>
+            <a:pPr lvl="1"/>
+            <a:r>
+              <a:rPr lang="nl-NL" dirty="0"/>
+              <a:t>We </a:t>
+            </a:r>
+            <a:r>
+              <a:rPr lang="nl-NL" dirty="0" err="1"/>
+              <a:t>allready</a:t>
+            </a:r>
+            <a:r>
+              <a:rPr lang="nl-NL" dirty="0"/>
+              <a:t> have </a:t>
+            </a:r>
+            <a:r>
+              <a:rPr lang="nl-NL" dirty="0" err="1"/>
+              <a:t>custom</a:t>
+            </a:r>
+            <a:r>
+              <a:rPr lang="nl-NL" dirty="0"/>
+              <a:t> </a:t>
+            </a:r>
+            <a:r>
+              <a:rPr lang="nl-NL" dirty="0" err="1"/>
+              <a:t>playlists</a:t>
+            </a:r>
+            <a:r>
+              <a:rPr lang="nl-NL" dirty="0"/>
+              <a:t> in </a:t>
+            </a:r>
+            <a:r>
+              <a:rPr lang="nl-NL" dirty="0" err="1"/>
+              <a:t>place</a:t>
+            </a:r>
+            <a:r>
+              <a:rPr lang="nl-NL" dirty="0"/>
+              <a:t>; we </a:t>
+            </a:r>
+            <a:r>
+              <a:rPr lang="nl-NL" dirty="0" err="1"/>
+              <a:t>need</a:t>
+            </a:r>
+            <a:r>
+              <a:rPr lang="nl-NL" dirty="0"/>
+              <a:t> </a:t>
+            </a:r>
+            <a:r>
+              <a:rPr lang="nl-NL" dirty="0" err="1"/>
+              <a:t>to</a:t>
+            </a:r>
+            <a:r>
+              <a:rPr lang="nl-NL" dirty="0"/>
+              <a:t> </a:t>
+            </a:r>
+            <a:r>
+              <a:rPr lang="nl-NL" dirty="0" err="1"/>
+              <a:t>disconnect</a:t>
+            </a:r>
+            <a:r>
+              <a:rPr lang="nl-NL" dirty="0"/>
+              <a:t> name </a:t>
+            </a:r>
+            <a:r>
+              <a:rPr lang="nl-NL" dirty="0" err="1"/>
+              <a:t>and</a:t>
+            </a:r>
+            <a:r>
+              <a:rPr lang="nl-NL" dirty="0"/>
+              <a:t> UUID</a:t>
+            </a:r>
+          </a:p>
+          <a:p>
+            <a:pPr lvl="1"/>
+            <a:r>
+              <a:rPr lang="nl-NL" dirty="0" err="1"/>
+              <a:t>Need</a:t>
+            </a:r>
+            <a:r>
+              <a:rPr lang="nl-NL" dirty="0"/>
+              <a:t> </a:t>
+            </a:r>
+            <a:r>
+              <a:rPr lang="nl-NL" dirty="0" err="1"/>
+              <a:t>to</a:t>
+            </a:r>
+            <a:r>
+              <a:rPr lang="nl-NL" dirty="0"/>
+              <a:t> make </a:t>
+            </a:r>
+            <a:r>
+              <a:rPr lang="nl-NL" dirty="0" err="1"/>
+              <a:t>it</a:t>
+            </a:r>
+            <a:r>
+              <a:rPr lang="nl-NL" dirty="0"/>
+              <a:t> easy </a:t>
+            </a:r>
+            <a:r>
+              <a:rPr lang="nl-NL" dirty="0" err="1"/>
+              <a:t>to</a:t>
+            </a:r>
+            <a:r>
+              <a:rPr lang="nl-NL" dirty="0"/>
+              <a:t> change </a:t>
+            </a:r>
+            <a:r>
+              <a:rPr lang="nl-NL" dirty="0" err="1"/>
+              <a:t>the</a:t>
+            </a:r>
+            <a:r>
+              <a:rPr lang="nl-NL" dirty="0"/>
+              <a:t> name of </a:t>
+            </a:r>
+            <a:r>
+              <a:rPr lang="nl-NL" dirty="0" err="1"/>
+              <a:t>the</a:t>
+            </a:r>
+            <a:r>
+              <a:rPr lang="nl-NL" dirty="0"/>
+              <a:t> </a:t>
+            </a:r>
+            <a:r>
+              <a:rPr lang="nl-NL" dirty="0" err="1"/>
+              <a:t>playlist</a:t>
+            </a:r>
+            <a:endParaRPr lang="nl-NL" dirty="0"/>
+          </a:p>
+          <a:p>
+            <a:pPr lvl="1"/>
+            <a:r>
+              <a:rPr lang="nl-NL" dirty="0" err="1"/>
+              <a:t>Need</a:t>
+            </a:r>
+            <a:r>
+              <a:rPr lang="nl-NL" dirty="0"/>
+              <a:t> </a:t>
+            </a:r>
+            <a:r>
+              <a:rPr lang="nl-NL" dirty="0" err="1"/>
+              <a:t>to</a:t>
+            </a:r>
+            <a:r>
+              <a:rPr lang="nl-NL" dirty="0"/>
+              <a:t> </a:t>
+            </a:r>
+            <a:r>
+              <a:rPr lang="nl-NL" dirty="0" err="1"/>
+              <a:t>distinguish</a:t>
+            </a:r>
+            <a:r>
+              <a:rPr lang="nl-NL" dirty="0"/>
+              <a:t> </a:t>
+            </a:r>
+            <a:r>
+              <a:rPr lang="nl-NL" dirty="0" err="1"/>
+              <a:t>between</a:t>
+            </a:r>
+            <a:r>
+              <a:rPr lang="nl-NL" dirty="0"/>
+              <a:t> special </a:t>
+            </a:r>
+            <a:r>
+              <a:rPr lang="nl-NL" dirty="0" err="1"/>
+              <a:t>and</a:t>
+            </a:r>
+            <a:r>
+              <a:rPr lang="nl-NL" dirty="0"/>
+              <a:t> </a:t>
+            </a:r>
+            <a:r>
+              <a:rPr lang="nl-NL" dirty="0" err="1"/>
+              <a:t>custom</a:t>
+            </a:r>
+            <a:r>
+              <a:rPr lang="nl-NL" dirty="0"/>
+              <a:t> </a:t>
+            </a:r>
+            <a:r>
+              <a:rPr lang="nl-NL" dirty="0" err="1"/>
+              <a:t>playlists</a:t>
+            </a:r>
+            <a:endParaRPr lang="nl-NL" dirty="0"/>
+          </a:p>
+          <a:p>
+            <a:pPr lvl="2"/>
+            <a:r>
+              <a:rPr lang="nl-NL" dirty="0"/>
+              <a:t>Special: </a:t>
+            </a:r>
+            <a:r>
+              <a:rPr lang="nl-NL" dirty="0" err="1"/>
+              <a:t>automatically</a:t>
+            </a:r>
+            <a:r>
+              <a:rPr lang="nl-NL" dirty="0"/>
+              <a:t> </a:t>
+            </a:r>
+            <a:r>
+              <a:rPr lang="nl-NL" dirty="0" err="1"/>
+              <a:t>generated</a:t>
+            </a:r>
+            <a:r>
+              <a:rPr lang="nl-NL" dirty="0"/>
+              <a:t>: E1, E2, </a:t>
+            </a:r>
+            <a:r>
+              <a:rPr lang="nl-NL" dirty="0" err="1"/>
+              <a:t>etc</a:t>
+            </a:r>
+            <a:r>
+              <a:rPr lang="nl-NL" dirty="0"/>
+              <a:t>; </a:t>
+            </a:r>
+            <a:r>
+              <a:rPr lang="nl-NL" dirty="0" err="1"/>
+              <a:t>session</a:t>
+            </a:r>
+            <a:r>
+              <a:rPr lang="nl-NL" dirty="0"/>
+              <a:t> </a:t>
+            </a:r>
+            <a:r>
+              <a:rPr lang="nl-NL" dirty="0" err="1"/>
+              <a:t>playlist</a:t>
+            </a:r>
+            <a:endParaRPr lang="nl-NL" dirty="0"/>
+          </a:p>
+          <a:p>
+            <a:pPr lvl="2"/>
+            <a:r>
+              <a:rPr lang="nl-NL" dirty="0" err="1"/>
+              <a:t>Custom</a:t>
+            </a:r>
+            <a:r>
+              <a:rPr lang="nl-NL" dirty="0"/>
+              <a:t>: </a:t>
+            </a:r>
+            <a:r>
+              <a:rPr lang="nl-NL" dirty="0" err="1"/>
+              <a:t>stored</a:t>
+            </a:r>
+            <a:r>
+              <a:rPr lang="nl-NL" dirty="0"/>
+              <a:t> </a:t>
+            </a:r>
+            <a:r>
+              <a:rPr lang="nl-NL" dirty="0" err="1"/>
+              <a:t>and</a:t>
+            </a:r>
+            <a:r>
+              <a:rPr lang="nl-NL" dirty="0"/>
+              <a:t> </a:t>
+            </a:r>
+            <a:r>
+              <a:rPr lang="nl-NL" dirty="0" err="1"/>
+              <a:t>retrieved</a:t>
+            </a:r>
+            <a:r>
+              <a:rPr lang="nl-NL" dirty="0"/>
+              <a:t>, songs </a:t>
+            </a:r>
+            <a:r>
+              <a:rPr lang="nl-NL" dirty="0" err="1"/>
+              <a:t>added</a:t>
+            </a:r>
+            <a:r>
+              <a:rPr lang="nl-NL" dirty="0"/>
+              <a:t> </a:t>
+            </a:r>
+            <a:r>
+              <a:rPr lang="nl-NL" dirty="0" err="1"/>
+              <a:t>by</a:t>
+            </a:r>
+            <a:r>
+              <a:rPr lang="nl-NL" dirty="0"/>
+              <a:t> user</a:t>
+            </a:r>
+          </a:p>
+          <a:p>
+            <a:pPr lvl="3"/>
+            <a:r>
+              <a:rPr lang="nl-NL" dirty="0" err="1"/>
+              <a:t>Added</a:t>
+            </a:r>
+            <a:r>
+              <a:rPr lang="nl-NL" dirty="0"/>
+              <a:t> </a:t>
+            </a:r>
+            <a:r>
+              <a:rPr lang="nl-NL" dirty="0" err="1"/>
+              <a:t>manually</a:t>
+            </a:r>
+            <a:endParaRPr lang="nl-NL" dirty="0"/>
+          </a:p>
+        </p:txBody>
+      </p:sp>
+    </p:spTree>
+    <p:extLst>
+      <p:ext uri="{BB962C8B-B14F-4D97-AF65-F5344CB8AC3E}">
+        <p14:creationId xmlns:p14="http://schemas.microsoft.com/office/powerpoint/2010/main" val="1248911224"/>
+      </p:ext>
+    </p:extLst>
+  </p:cSld>
+  <p:clrMapOvr>
+    <a:masterClrMapping/>
+  </p:clrMapOvr>
+</p:sld>
+</file>
+
+<file path=ppt/slides/slide6.xml><?xml version="1.0" encoding="utf-8"?>
+<p:sld xmlns:a="http://schemas.openxmlformats.org/drawingml/2006/main" xmlns:r="http://schemas.openxmlformats.org/officeDocument/2006/relationships" xmlns:p="http://schemas.openxmlformats.org/presentationml/2006/main">
+  <p:cSld>
+    <p:spTree>
+      <p:nvGrpSpPr>
+        <p:cNvPr id="1" name=""/>
+        <p:cNvGrpSpPr/>
+        <p:nvPr/>
+      </p:nvGrpSpPr>
+      <p:grpSpPr>
+        <a:xfrm>
+          <a:off x="0" y="0"/>
+          <a:ext cx="0" cy="0"/>
+          <a:chOff x="0" y="0"/>
+          <a:chExt cx="0" cy="0"/>
+        </a:xfrm>
+      </p:grpSpPr>
+      <p:sp>
+        <p:nvSpPr>
+          <p:cNvPr id="2" name="Title 1">
+            <a:extLst>
+              <a:ext uri="{FF2B5EF4-FFF2-40B4-BE49-F238E27FC236}">
+                <a16:creationId xmlns:a16="http://schemas.microsoft.com/office/drawing/2014/main" id="{87E954C1-30F7-60FB-992F-8C83A6ED9120}"/>
+              </a:ext>
+            </a:extLst>
+          </p:cNvPr>
+          <p:cNvSpPr>
+            <a:spLocks noGrp="1"/>
+          </p:cNvSpPr>
+          <p:nvPr>
+            <p:ph type="title"/>
+          </p:nvPr>
+        </p:nvSpPr>
+        <p:spPr/>
+        <p:txBody>
+          <a:bodyPr/>
+          <a:lstStyle/>
+          <a:p>
+            <a:r>
+              <a:rPr lang="nl-NL" dirty="0" err="1"/>
+              <a:t>Custom</a:t>
+            </a:r>
+            <a:r>
+              <a:rPr lang="nl-NL" dirty="0"/>
+              <a:t> </a:t>
+            </a:r>
+            <a:r>
+              <a:rPr lang="nl-NL" dirty="0" err="1"/>
+              <a:t>playlists</a:t>
+            </a:r>
+            <a:endParaRPr lang="nl-NL" dirty="0"/>
+          </a:p>
+        </p:txBody>
+      </p:sp>
+      <p:graphicFrame>
+        <p:nvGraphicFramePr>
+          <p:cNvPr id="4" name="Table 3">
+            <a:extLst>
+              <a:ext uri="{FF2B5EF4-FFF2-40B4-BE49-F238E27FC236}">
+                <a16:creationId xmlns:a16="http://schemas.microsoft.com/office/drawing/2014/main" id="{A02AE5E7-028A-0A30-4EE2-5FC64CDD5885}"/>
+              </a:ext>
+            </a:extLst>
+          </p:cNvPr>
+          <p:cNvGraphicFramePr>
+            <a:graphicFrameLocks noGrp="1"/>
+          </p:cNvGraphicFramePr>
+          <p:nvPr>
+            <p:extLst>
+              <p:ext uri="{D42A27DB-BD31-4B8C-83A1-F6EECF244321}">
+                <p14:modId xmlns:p14="http://schemas.microsoft.com/office/powerpoint/2010/main" val="158376004"/>
+              </p:ext>
+            </p:extLst>
+          </p:nvPr>
+        </p:nvGraphicFramePr>
+        <p:xfrm>
+          <a:off x="1611376" y="1762082"/>
+          <a:ext cx="8128000" cy="2225040"/>
+        </p:xfrm>
+        <a:graphic>
+          <a:graphicData uri="http://schemas.openxmlformats.org/drawingml/2006/table">
+            <a:tbl>
+              <a:tblPr firstRow="1" bandRow="1">
+                <a:tableStyleId>{5C22544A-7EE6-4342-B048-85BDC9FD1C3A}</a:tableStyleId>
+              </a:tblPr>
+              <a:tblGrid>
+                <a:gridCol w="4064000">
+                  <a:extLst>
+                    <a:ext uri="{9D8B030D-6E8A-4147-A177-3AD203B41FA5}">
+                      <a16:colId xmlns:a16="http://schemas.microsoft.com/office/drawing/2014/main" val="2305248823"/>
+                    </a:ext>
+                  </a:extLst>
+                </a:gridCol>
+                <a:gridCol w="4064000">
+                  <a:extLst>
+                    <a:ext uri="{9D8B030D-6E8A-4147-A177-3AD203B41FA5}">
+                      <a16:colId xmlns:a16="http://schemas.microsoft.com/office/drawing/2014/main" val="3481106676"/>
+                    </a:ext>
+                  </a:extLst>
+                </a:gridCol>
+              </a:tblGrid>
+              <a:tr h="370840">
+                <a:tc>
+                  <a:txBody>
+                    <a:bodyPr/>
+                    <a:lstStyle/>
+                    <a:p>
+                      <a:r>
+                        <a:rPr lang="nl-NL" dirty="0"/>
+                        <a:t>UUID</a:t>
+                      </a:r>
+                    </a:p>
+                  </a:txBody>
+                  <a:tcPr/>
+                </a:tc>
+                <a:tc>
+                  <a:txBody>
+                    <a:bodyPr/>
+                    <a:lstStyle/>
+                    <a:p>
+                      <a:r>
+                        <a:rPr lang="nl-NL" dirty="0"/>
+                        <a:t>Name</a:t>
+                      </a:r>
+                    </a:p>
+                  </a:txBody>
+                  <a:tcPr/>
+                </a:tc>
+                <a:extLst>
+                  <a:ext uri="{0D108BD9-81ED-4DB2-BD59-A6C34878D82A}">
+                    <a16:rowId xmlns:a16="http://schemas.microsoft.com/office/drawing/2014/main" val="1585065313"/>
+                  </a:ext>
+                </a:extLst>
+              </a:tr>
+              <a:tr h="370840">
+                <a:tc>
+                  <a:txBody>
+                    <a:bodyPr/>
+                    <a:lstStyle/>
+                    <a:p>
+                      <a:endParaRPr lang="nl-NL" dirty="0"/>
+                    </a:p>
+                  </a:txBody>
+                  <a:tcPr/>
+                </a:tc>
+                <a:tc>
+                  <a:txBody>
+                    <a:bodyPr/>
+                    <a:lstStyle/>
+                    <a:p>
+                      <a:endParaRPr lang="nl-NL"/>
+                    </a:p>
+                  </a:txBody>
+                  <a:tcPr/>
+                </a:tc>
+                <a:extLst>
+                  <a:ext uri="{0D108BD9-81ED-4DB2-BD59-A6C34878D82A}">
+                    <a16:rowId xmlns:a16="http://schemas.microsoft.com/office/drawing/2014/main" val="1809024299"/>
+                  </a:ext>
+                </a:extLst>
+              </a:tr>
+              <a:tr h="370840">
+                <a:tc>
+                  <a:txBody>
+                    <a:bodyPr/>
+                    <a:lstStyle/>
+                    <a:p>
+                      <a:endParaRPr lang="nl-NL"/>
+                    </a:p>
+                  </a:txBody>
+                  <a:tcPr/>
+                </a:tc>
+                <a:tc>
+                  <a:txBody>
+                    <a:bodyPr/>
+                    <a:lstStyle/>
+                    <a:p>
+                      <a:endParaRPr lang="nl-NL"/>
+                    </a:p>
+                  </a:txBody>
+                  <a:tcPr/>
+                </a:tc>
+                <a:extLst>
+                  <a:ext uri="{0D108BD9-81ED-4DB2-BD59-A6C34878D82A}">
+                    <a16:rowId xmlns:a16="http://schemas.microsoft.com/office/drawing/2014/main" val="212383704"/>
+                  </a:ext>
+                </a:extLst>
+              </a:tr>
+              <a:tr h="370840">
+                <a:tc>
+                  <a:txBody>
+                    <a:bodyPr/>
+                    <a:lstStyle/>
+                    <a:p>
+                      <a:endParaRPr lang="nl-NL"/>
+                    </a:p>
+                  </a:txBody>
+                  <a:tcPr/>
+                </a:tc>
+                <a:tc>
+                  <a:txBody>
+                    <a:bodyPr/>
+                    <a:lstStyle/>
+                    <a:p>
+                      <a:endParaRPr lang="nl-NL"/>
+                    </a:p>
+                  </a:txBody>
+                  <a:tcPr/>
+                </a:tc>
+                <a:extLst>
+                  <a:ext uri="{0D108BD9-81ED-4DB2-BD59-A6C34878D82A}">
+                    <a16:rowId xmlns:a16="http://schemas.microsoft.com/office/drawing/2014/main" val="1929658889"/>
+                  </a:ext>
+                </a:extLst>
+              </a:tr>
+              <a:tr h="370840">
+                <a:tc>
+                  <a:txBody>
+                    <a:bodyPr/>
+                    <a:lstStyle/>
+                    <a:p>
+                      <a:endParaRPr lang="nl-NL"/>
+                    </a:p>
+                  </a:txBody>
+                  <a:tcPr/>
+                </a:tc>
+                <a:tc>
+                  <a:txBody>
+                    <a:bodyPr/>
+                    <a:lstStyle/>
+                    <a:p>
+                      <a:endParaRPr lang="nl-NL"/>
+                    </a:p>
+                  </a:txBody>
+                  <a:tcPr/>
+                </a:tc>
+                <a:extLst>
+                  <a:ext uri="{0D108BD9-81ED-4DB2-BD59-A6C34878D82A}">
+                    <a16:rowId xmlns:a16="http://schemas.microsoft.com/office/drawing/2014/main" val="4111455040"/>
+                  </a:ext>
+                </a:extLst>
+              </a:tr>
+              <a:tr h="370840">
+                <a:tc>
+                  <a:txBody>
+                    <a:bodyPr/>
+                    <a:lstStyle/>
+                    <a:p>
+                      <a:endParaRPr lang="nl-NL"/>
+                    </a:p>
+                  </a:txBody>
+                  <a:tcPr/>
+                </a:tc>
+                <a:tc>
+                  <a:txBody>
+                    <a:bodyPr/>
+                    <a:lstStyle/>
+                    <a:p>
+                      <a:endParaRPr lang="nl-NL" dirty="0"/>
+                    </a:p>
+                  </a:txBody>
+                  <a:tcPr/>
+                </a:tc>
+                <a:extLst>
+                  <a:ext uri="{0D108BD9-81ED-4DB2-BD59-A6C34878D82A}">
+                    <a16:rowId xmlns:a16="http://schemas.microsoft.com/office/drawing/2014/main" val="102220629"/>
+                  </a:ext>
+                </a:extLst>
+              </a:tr>
+            </a:tbl>
+          </a:graphicData>
+        </a:graphic>
+      </p:graphicFrame>
+    </p:spTree>
+    <p:extLst>
+      <p:ext uri="{BB962C8B-B14F-4D97-AF65-F5344CB8AC3E}">
+        <p14:creationId xmlns:p14="http://schemas.microsoft.com/office/powerpoint/2010/main" val="1957822881"/>
       </p:ext>
     </p:extLst>
   </p:cSld>

</xml_diff>